<commit_message>
Fix back image bug
</commit_message>
<xml_diff>
--- a/songbooks/010 - Practice/040 - Guns n Roses - Sweet Child of mine.pptx
+++ b/songbooks/010 - Practice/040 - Guns n Roses - Sweet Child of mine.pptx
@@ -6,7 +6,8 @@
   </p:sldMasterIdLst>
   <p:sldIdLst>
     <p:sldId id="256" r:id="rId2"/>
-    <p:sldId id="257" r:id="rId3"/>
+    <p:sldId id="259" r:id="rId3"/>
+    <p:sldId id="260" r:id="rId4"/>
   </p:sldIdLst>
   <p:sldSz cx="9144000" cy="6858000" type="screen4x3"/>
   <p:notesSz cx="6858000" cy="9144000"/>
@@ -155,7 +156,7 @@
           </a:lstStyle>
           <a:p>
             <a:r>
-              <a:rPr lang="en-US" smtClean="0"/>
+              <a:rPr lang="en-US"/>
               <a:t>Click to edit Master title style</a:t>
             </a:r>
             <a:endParaRPr lang="en-US" dirty="0"/>
@@ -220,7 +221,7 @@
           </a:lstStyle>
           <a:p>
             <a:r>
-              <a:rPr lang="en-US" smtClean="0"/>
+              <a:rPr lang="en-US"/>
               <a:t>Click to edit Master subtitle style</a:t>
             </a:r>
             <a:endParaRPr lang="en-US" dirty="0"/>
@@ -244,7 +245,7 @@
           <a:p>
             <a:fld id="{C8AC561D-1F07-4328-AAF9-3DA110110DCF}" type="datetimeFigureOut">
               <a:rPr lang="fr-CH" smtClean="0"/>
-              <a:t>18.07.2025</a:t>
+              <a:t>21.07.2025</a:t>
             </a:fld>
             <a:endParaRPr lang="fr-CH"/>
           </a:p>
@@ -338,7 +339,7 @@
           <a:lstStyle/>
           <a:p>
             <a:r>
-              <a:rPr lang="en-US" smtClean="0"/>
+              <a:rPr lang="en-US"/>
               <a:t>Click to edit Master title style</a:t>
             </a:r>
             <a:endParaRPr lang="en-US" dirty="0"/>
@@ -362,35 +363,35 @@
           <a:p>
             <a:pPr lvl="0"/>
             <a:r>
-              <a:rPr lang="en-US" smtClean="0"/>
+              <a:rPr lang="en-US"/>
               <a:t>Edit Master text styles</a:t>
             </a:r>
           </a:p>
           <a:p>
             <a:pPr lvl="1"/>
             <a:r>
-              <a:rPr lang="en-US" smtClean="0"/>
+              <a:rPr lang="en-US"/>
               <a:t>Second level</a:t>
             </a:r>
           </a:p>
           <a:p>
             <a:pPr lvl="2"/>
             <a:r>
-              <a:rPr lang="en-US" smtClean="0"/>
+              <a:rPr lang="en-US"/>
               <a:t>Third level</a:t>
             </a:r>
           </a:p>
           <a:p>
             <a:pPr lvl="3"/>
             <a:r>
-              <a:rPr lang="en-US" smtClean="0"/>
+              <a:rPr lang="en-US"/>
               <a:t>Fourth level</a:t>
             </a:r>
           </a:p>
           <a:p>
             <a:pPr lvl="4"/>
             <a:r>
-              <a:rPr lang="en-US" smtClean="0"/>
+              <a:rPr lang="en-US"/>
               <a:t>Fifth level</a:t>
             </a:r>
             <a:endParaRPr lang="en-US" dirty="0"/>
@@ -414,7 +415,7 @@
           <a:p>
             <a:fld id="{C8AC561D-1F07-4328-AAF9-3DA110110DCF}" type="datetimeFigureOut">
               <a:rPr lang="fr-CH" smtClean="0"/>
-              <a:t>18.07.2025</a:t>
+              <a:t>21.07.2025</a:t>
             </a:fld>
             <a:endParaRPr lang="fr-CH"/>
           </a:p>
@@ -513,7 +514,7 @@
           <a:lstStyle/>
           <a:p>
             <a:r>
-              <a:rPr lang="en-US" smtClean="0"/>
+              <a:rPr lang="en-US"/>
               <a:t>Click to edit Master title style</a:t>
             </a:r>
             <a:endParaRPr lang="en-US" dirty="0"/>
@@ -542,35 +543,35 @@
           <a:p>
             <a:pPr lvl="0"/>
             <a:r>
-              <a:rPr lang="en-US" smtClean="0"/>
+              <a:rPr lang="en-US"/>
               <a:t>Edit Master text styles</a:t>
             </a:r>
           </a:p>
           <a:p>
             <a:pPr lvl="1"/>
             <a:r>
-              <a:rPr lang="en-US" smtClean="0"/>
+              <a:rPr lang="en-US"/>
               <a:t>Second level</a:t>
             </a:r>
           </a:p>
           <a:p>
             <a:pPr lvl="2"/>
             <a:r>
-              <a:rPr lang="en-US" smtClean="0"/>
+              <a:rPr lang="en-US"/>
               <a:t>Third level</a:t>
             </a:r>
           </a:p>
           <a:p>
             <a:pPr lvl="3"/>
             <a:r>
-              <a:rPr lang="en-US" smtClean="0"/>
+              <a:rPr lang="en-US"/>
               <a:t>Fourth level</a:t>
             </a:r>
           </a:p>
           <a:p>
             <a:pPr lvl="4"/>
             <a:r>
-              <a:rPr lang="en-US" smtClean="0"/>
+              <a:rPr lang="en-US"/>
               <a:t>Fifth level</a:t>
             </a:r>
             <a:endParaRPr lang="en-US" dirty="0"/>
@@ -594,7 +595,7 @@
           <a:p>
             <a:fld id="{C8AC561D-1F07-4328-AAF9-3DA110110DCF}" type="datetimeFigureOut">
               <a:rPr lang="fr-CH" smtClean="0"/>
-              <a:t>18.07.2025</a:t>
+              <a:t>21.07.2025</a:t>
             </a:fld>
             <a:endParaRPr lang="fr-CH"/>
           </a:p>
@@ -688,7 +689,7 @@
           <a:lstStyle/>
           <a:p>
             <a:r>
-              <a:rPr lang="en-US" smtClean="0"/>
+              <a:rPr lang="en-US"/>
               <a:t>Click to edit Master title style</a:t>
             </a:r>
             <a:endParaRPr lang="en-US" dirty="0"/>
@@ -712,35 +713,35 @@
           <a:p>
             <a:pPr lvl="0"/>
             <a:r>
-              <a:rPr lang="en-US" smtClean="0"/>
+              <a:rPr lang="en-US"/>
               <a:t>Edit Master text styles</a:t>
             </a:r>
           </a:p>
           <a:p>
             <a:pPr lvl="1"/>
             <a:r>
-              <a:rPr lang="en-US" smtClean="0"/>
+              <a:rPr lang="en-US"/>
               <a:t>Second level</a:t>
             </a:r>
           </a:p>
           <a:p>
             <a:pPr lvl="2"/>
             <a:r>
-              <a:rPr lang="en-US" smtClean="0"/>
+              <a:rPr lang="en-US"/>
               <a:t>Third level</a:t>
             </a:r>
           </a:p>
           <a:p>
             <a:pPr lvl="3"/>
             <a:r>
-              <a:rPr lang="en-US" smtClean="0"/>
+              <a:rPr lang="en-US"/>
               <a:t>Fourth level</a:t>
             </a:r>
           </a:p>
           <a:p>
             <a:pPr lvl="4"/>
             <a:r>
-              <a:rPr lang="en-US" smtClean="0"/>
+              <a:rPr lang="en-US"/>
               <a:t>Fifth level</a:t>
             </a:r>
             <a:endParaRPr lang="en-US" dirty="0"/>
@@ -764,7 +765,7 @@
           <a:p>
             <a:fld id="{C8AC561D-1F07-4328-AAF9-3DA110110DCF}" type="datetimeFigureOut">
               <a:rPr lang="fr-CH" smtClean="0"/>
-              <a:t>18.07.2025</a:t>
+              <a:t>21.07.2025</a:t>
             </a:fld>
             <a:endParaRPr lang="fr-CH"/>
           </a:p>
@@ -867,7 +868,7 @@
           </a:lstStyle>
           <a:p>
             <a:r>
-              <a:rPr lang="en-US" smtClean="0"/>
+              <a:rPr lang="en-US"/>
               <a:t>Click to edit Master title style</a:t>
             </a:r>
             <a:endParaRPr lang="en-US" dirty="0"/>
@@ -985,7 +986,7 @@
           <a:p>
             <a:pPr lvl="0"/>
             <a:r>
-              <a:rPr lang="en-US" smtClean="0"/>
+              <a:rPr lang="en-US"/>
               <a:t>Edit Master text styles</a:t>
             </a:r>
           </a:p>
@@ -1008,7 +1009,7 @@
           <a:p>
             <a:fld id="{C8AC561D-1F07-4328-AAF9-3DA110110DCF}" type="datetimeFigureOut">
               <a:rPr lang="fr-CH" smtClean="0"/>
-              <a:t>18.07.2025</a:t>
+              <a:t>21.07.2025</a:t>
             </a:fld>
             <a:endParaRPr lang="fr-CH"/>
           </a:p>
@@ -1102,7 +1103,7 @@
           <a:lstStyle/>
           <a:p>
             <a:r>
-              <a:rPr lang="en-US" smtClean="0"/>
+              <a:rPr lang="en-US"/>
               <a:t>Click to edit Master title style</a:t>
             </a:r>
             <a:endParaRPr lang="en-US" dirty="0"/>
@@ -1131,35 +1132,35 @@
           <a:p>
             <a:pPr lvl="0"/>
             <a:r>
-              <a:rPr lang="en-US" smtClean="0"/>
+              <a:rPr lang="en-US"/>
               <a:t>Edit Master text styles</a:t>
             </a:r>
           </a:p>
           <a:p>
             <a:pPr lvl="1"/>
             <a:r>
-              <a:rPr lang="en-US" smtClean="0"/>
+              <a:rPr lang="en-US"/>
               <a:t>Second level</a:t>
             </a:r>
           </a:p>
           <a:p>
             <a:pPr lvl="2"/>
             <a:r>
-              <a:rPr lang="en-US" smtClean="0"/>
+              <a:rPr lang="en-US"/>
               <a:t>Third level</a:t>
             </a:r>
           </a:p>
           <a:p>
             <a:pPr lvl="3"/>
             <a:r>
-              <a:rPr lang="en-US" smtClean="0"/>
+              <a:rPr lang="en-US"/>
               <a:t>Fourth level</a:t>
             </a:r>
           </a:p>
           <a:p>
             <a:pPr lvl="4"/>
             <a:r>
-              <a:rPr lang="en-US" smtClean="0"/>
+              <a:rPr lang="en-US"/>
               <a:t>Fifth level</a:t>
             </a:r>
             <a:endParaRPr lang="en-US" dirty="0"/>
@@ -1188,35 +1189,35 @@
           <a:p>
             <a:pPr lvl="0"/>
             <a:r>
-              <a:rPr lang="en-US" smtClean="0"/>
+              <a:rPr lang="en-US"/>
               <a:t>Edit Master text styles</a:t>
             </a:r>
           </a:p>
           <a:p>
             <a:pPr lvl="1"/>
             <a:r>
-              <a:rPr lang="en-US" smtClean="0"/>
+              <a:rPr lang="en-US"/>
               <a:t>Second level</a:t>
             </a:r>
           </a:p>
           <a:p>
             <a:pPr lvl="2"/>
             <a:r>
-              <a:rPr lang="en-US" smtClean="0"/>
+              <a:rPr lang="en-US"/>
               <a:t>Third level</a:t>
             </a:r>
           </a:p>
           <a:p>
             <a:pPr lvl="3"/>
             <a:r>
-              <a:rPr lang="en-US" smtClean="0"/>
+              <a:rPr lang="en-US"/>
               <a:t>Fourth level</a:t>
             </a:r>
           </a:p>
           <a:p>
             <a:pPr lvl="4"/>
             <a:r>
-              <a:rPr lang="en-US" smtClean="0"/>
+              <a:rPr lang="en-US"/>
               <a:t>Fifth level</a:t>
             </a:r>
             <a:endParaRPr lang="en-US" dirty="0"/>
@@ -1240,7 +1241,7 @@
           <a:p>
             <a:fld id="{C8AC561D-1F07-4328-AAF9-3DA110110DCF}" type="datetimeFigureOut">
               <a:rPr lang="fr-CH" smtClean="0"/>
-              <a:t>18.07.2025</a:t>
+              <a:t>21.07.2025</a:t>
             </a:fld>
             <a:endParaRPr lang="fr-CH"/>
           </a:p>
@@ -1339,7 +1340,7 @@
           <a:lstStyle/>
           <a:p>
             <a:r>
-              <a:rPr lang="en-US" smtClean="0"/>
+              <a:rPr lang="en-US"/>
               <a:t>Click to edit Master title style</a:t>
             </a:r>
             <a:endParaRPr lang="en-US" dirty="0"/>
@@ -1405,7 +1406,7 @@
           <a:p>
             <a:pPr lvl="0"/>
             <a:r>
-              <a:rPr lang="en-US" smtClean="0"/>
+              <a:rPr lang="en-US"/>
               <a:t>Edit Master text styles</a:t>
             </a:r>
           </a:p>
@@ -1433,35 +1434,35 @@
           <a:p>
             <a:pPr lvl="0"/>
             <a:r>
-              <a:rPr lang="en-US" smtClean="0"/>
+              <a:rPr lang="en-US"/>
               <a:t>Edit Master text styles</a:t>
             </a:r>
           </a:p>
           <a:p>
             <a:pPr lvl="1"/>
             <a:r>
-              <a:rPr lang="en-US" smtClean="0"/>
+              <a:rPr lang="en-US"/>
               <a:t>Second level</a:t>
             </a:r>
           </a:p>
           <a:p>
             <a:pPr lvl="2"/>
             <a:r>
-              <a:rPr lang="en-US" smtClean="0"/>
+              <a:rPr lang="en-US"/>
               <a:t>Third level</a:t>
             </a:r>
           </a:p>
           <a:p>
             <a:pPr lvl="3"/>
             <a:r>
-              <a:rPr lang="en-US" smtClean="0"/>
+              <a:rPr lang="en-US"/>
               <a:t>Fourth level</a:t>
             </a:r>
           </a:p>
           <a:p>
             <a:pPr lvl="4"/>
             <a:r>
-              <a:rPr lang="en-US" smtClean="0"/>
+              <a:rPr lang="en-US"/>
               <a:t>Fifth level</a:t>
             </a:r>
             <a:endParaRPr lang="en-US" dirty="0"/>
@@ -1527,7 +1528,7 @@
           <a:p>
             <a:pPr lvl="0"/>
             <a:r>
-              <a:rPr lang="en-US" smtClean="0"/>
+              <a:rPr lang="en-US"/>
               <a:t>Edit Master text styles</a:t>
             </a:r>
           </a:p>
@@ -1555,35 +1556,35 @@
           <a:p>
             <a:pPr lvl="0"/>
             <a:r>
-              <a:rPr lang="en-US" smtClean="0"/>
+              <a:rPr lang="en-US"/>
               <a:t>Edit Master text styles</a:t>
             </a:r>
           </a:p>
           <a:p>
             <a:pPr lvl="1"/>
             <a:r>
-              <a:rPr lang="en-US" smtClean="0"/>
+              <a:rPr lang="en-US"/>
               <a:t>Second level</a:t>
             </a:r>
           </a:p>
           <a:p>
             <a:pPr lvl="2"/>
             <a:r>
-              <a:rPr lang="en-US" smtClean="0"/>
+              <a:rPr lang="en-US"/>
               <a:t>Third level</a:t>
             </a:r>
           </a:p>
           <a:p>
             <a:pPr lvl="3"/>
             <a:r>
-              <a:rPr lang="en-US" smtClean="0"/>
+              <a:rPr lang="en-US"/>
               <a:t>Fourth level</a:t>
             </a:r>
           </a:p>
           <a:p>
             <a:pPr lvl="4"/>
             <a:r>
-              <a:rPr lang="en-US" smtClean="0"/>
+              <a:rPr lang="en-US"/>
               <a:t>Fifth level</a:t>
             </a:r>
             <a:endParaRPr lang="en-US" dirty="0"/>
@@ -1607,7 +1608,7 @@
           <a:p>
             <a:fld id="{C8AC561D-1F07-4328-AAF9-3DA110110DCF}" type="datetimeFigureOut">
               <a:rPr lang="fr-CH" smtClean="0"/>
-              <a:t>18.07.2025</a:t>
+              <a:t>21.07.2025</a:t>
             </a:fld>
             <a:endParaRPr lang="fr-CH"/>
           </a:p>
@@ -1701,7 +1702,7 @@
           <a:lstStyle/>
           <a:p>
             <a:r>
-              <a:rPr lang="en-US" smtClean="0"/>
+              <a:rPr lang="en-US"/>
               <a:t>Click to edit Master title style</a:t>
             </a:r>
             <a:endParaRPr lang="en-US" dirty="0"/>
@@ -1725,7 +1726,7 @@
           <a:p>
             <a:fld id="{C8AC561D-1F07-4328-AAF9-3DA110110DCF}" type="datetimeFigureOut">
               <a:rPr lang="fr-CH" smtClean="0"/>
-              <a:t>18.07.2025</a:t>
+              <a:t>21.07.2025</a:t>
             </a:fld>
             <a:endParaRPr lang="fr-CH"/>
           </a:p>
@@ -1820,7 +1821,7 @@
           <a:p>
             <a:fld id="{C8AC561D-1F07-4328-AAF9-3DA110110DCF}" type="datetimeFigureOut">
               <a:rPr lang="fr-CH" smtClean="0"/>
-              <a:t>18.07.2025</a:t>
+              <a:t>21.07.2025</a:t>
             </a:fld>
             <a:endParaRPr lang="fr-CH"/>
           </a:p>
@@ -1923,7 +1924,7 @@
           </a:lstStyle>
           <a:p>
             <a:r>
-              <a:rPr lang="en-US" smtClean="0"/>
+              <a:rPr lang="en-US"/>
               <a:t>Click to edit Master title style</a:t>
             </a:r>
             <a:endParaRPr lang="en-US" dirty="0"/>
@@ -1980,35 +1981,35 @@
           <a:p>
             <a:pPr lvl="0"/>
             <a:r>
-              <a:rPr lang="en-US" smtClean="0"/>
+              <a:rPr lang="en-US"/>
               <a:t>Edit Master text styles</a:t>
             </a:r>
           </a:p>
           <a:p>
             <a:pPr lvl="1"/>
             <a:r>
-              <a:rPr lang="en-US" smtClean="0"/>
+              <a:rPr lang="en-US"/>
               <a:t>Second level</a:t>
             </a:r>
           </a:p>
           <a:p>
             <a:pPr lvl="2"/>
             <a:r>
-              <a:rPr lang="en-US" smtClean="0"/>
+              <a:rPr lang="en-US"/>
               <a:t>Third level</a:t>
             </a:r>
           </a:p>
           <a:p>
             <a:pPr lvl="3"/>
             <a:r>
-              <a:rPr lang="en-US" smtClean="0"/>
+              <a:rPr lang="en-US"/>
               <a:t>Fourth level</a:t>
             </a:r>
           </a:p>
           <a:p>
             <a:pPr lvl="4"/>
             <a:r>
-              <a:rPr lang="en-US" smtClean="0"/>
+              <a:rPr lang="en-US"/>
               <a:t>Fifth level</a:t>
             </a:r>
             <a:endParaRPr lang="en-US" dirty="0"/>
@@ -2074,7 +2075,7 @@
           <a:p>
             <a:pPr lvl="0"/>
             <a:r>
-              <a:rPr lang="en-US" smtClean="0"/>
+              <a:rPr lang="en-US"/>
               <a:t>Edit Master text styles</a:t>
             </a:r>
           </a:p>
@@ -2097,7 +2098,7 @@
           <a:p>
             <a:fld id="{C8AC561D-1F07-4328-AAF9-3DA110110DCF}" type="datetimeFigureOut">
               <a:rPr lang="fr-CH" smtClean="0"/>
-              <a:t>18.07.2025</a:t>
+              <a:t>21.07.2025</a:t>
             </a:fld>
             <a:endParaRPr lang="fr-CH"/>
           </a:p>
@@ -2200,7 +2201,7 @@
           </a:lstStyle>
           <a:p>
             <a:r>
-              <a:rPr lang="en-US" smtClean="0"/>
+              <a:rPr lang="en-US"/>
               <a:t>Click to edit Master title style</a:t>
             </a:r>
             <a:endParaRPr lang="en-US" dirty="0"/>
@@ -2265,7 +2266,7 @@
           </a:lstStyle>
           <a:p>
             <a:r>
-              <a:rPr lang="en-US" smtClean="0"/>
+              <a:rPr lang="en-US"/>
               <a:t>Click icon to add picture</a:t>
             </a:r>
             <a:endParaRPr lang="en-US" dirty="0"/>
@@ -2331,7 +2332,7 @@
           <a:p>
             <a:pPr lvl="0"/>
             <a:r>
-              <a:rPr lang="en-US" smtClean="0"/>
+              <a:rPr lang="en-US"/>
               <a:t>Edit Master text styles</a:t>
             </a:r>
           </a:p>
@@ -2354,7 +2355,7 @@
           <a:p>
             <a:fld id="{C8AC561D-1F07-4328-AAF9-3DA110110DCF}" type="datetimeFigureOut">
               <a:rPr lang="fr-CH" smtClean="0"/>
-              <a:t>18.07.2025</a:t>
+              <a:t>21.07.2025</a:t>
             </a:fld>
             <a:endParaRPr lang="fr-CH"/>
           </a:p>
@@ -2463,7 +2464,7 @@
           <a:lstStyle/>
           <a:p>
             <a:r>
-              <a:rPr lang="en-US" smtClean="0"/>
+              <a:rPr lang="en-US"/>
               <a:t>Click to edit Master title style</a:t>
             </a:r>
             <a:endParaRPr lang="en-US" dirty="0"/>
@@ -2497,35 +2498,35 @@
           <a:p>
             <a:pPr lvl="0"/>
             <a:r>
-              <a:rPr lang="en-US" smtClean="0"/>
+              <a:rPr lang="en-US"/>
               <a:t>Edit Master text styles</a:t>
             </a:r>
           </a:p>
           <a:p>
             <a:pPr lvl="1"/>
             <a:r>
-              <a:rPr lang="en-US" smtClean="0"/>
+              <a:rPr lang="en-US"/>
               <a:t>Second level</a:t>
             </a:r>
           </a:p>
           <a:p>
             <a:pPr lvl="2"/>
             <a:r>
-              <a:rPr lang="en-US" smtClean="0"/>
+              <a:rPr lang="en-US"/>
               <a:t>Third level</a:t>
             </a:r>
           </a:p>
           <a:p>
             <a:pPr lvl="3"/>
             <a:r>
-              <a:rPr lang="en-US" smtClean="0"/>
+              <a:rPr lang="en-US"/>
               <a:t>Fourth level</a:t>
             </a:r>
           </a:p>
           <a:p>
             <a:pPr lvl="4"/>
             <a:r>
-              <a:rPr lang="en-US" smtClean="0"/>
+              <a:rPr lang="en-US"/>
               <a:t>Fifth level</a:t>
             </a:r>
             <a:endParaRPr lang="en-US" dirty="0"/>
@@ -2567,7 +2568,7 @@
           <a:p>
             <a:fld id="{C8AC561D-1F07-4328-AAF9-3DA110110DCF}" type="datetimeFigureOut">
               <a:rPr lang="fr-CH" smtClean="0"/>
-              <a:t>18.07.2025</a:t>
+              <a:t>21.07.2025</a:t>
             </a:fld>
             <a:endParaRPr lang="fr-CH"/>
           </a:p>
@@ -3056,64 +3057,7 @@
                 </a:solidFill>
                 <a:latin typeface="Arial" panose="020B0604020202020204" pitchFamily="34" charset="0"/>
               </a:rPr>
-              <a:t>You call arrows to fall short</a:t>
-            </a:r>
-          </a:p>
-          <a:p>
-            <a:pPr lvl="0" defTabSz="914400" eaLnBrk="0" fontAlgn="base" hangingPunct="0">
-              <a:spcBef>
-                <a:spcPct val="0"/>
-              </a:spcBef>
-              <a:spcAft>
-                <a:spcPct val="0"/>
-              </a:spcAft>
-            </a:pPr>
-            <a:r>
-              <a:rPr lang="en-US" altLang="fr-FR" sz="2000" b="1" dirty="0">
-                <a:solidFill>
-                  <a:schemeClr val="bg1"/>
-                </a:solidFill>
-                <a:latin typeface="Arial" panose="020B0604020202020204" pitchFamily="34" charset="0"/>
-              </a:rPr>
-              <a:t>Because the snow is at our feet</a:t>
-            </a:r>
-          </a:p>
-          <a:p>
-            <a:pPr lvl="0" defTabSz="914400" eaLnBrk="0" fontAlgn="base" hangingPunct="0">
-              <a:spcBef>
-                <a:spcPct val="0"/>
-              </a:spcBef>
-              <a:spcAft>
-                <a:spcPct val="0"/>
-              </a:spcAft>
-            </a:pPr>
-            <a:r>
-              <a:rPr lang="en-US" altLang="fr-FR" sz="2000" b="1" dirty="0">
-                <a:solidFill>
-                  <a:schemeClr val="bg1"/>
-                </a:solidFill>
-                <a:latin typeface="Arial" panose="020B0604020202020204" pitchFamily="34" charset="0"/>
-              </a:rPr>
-              <a:t>When embraces subside, and the lilies have died</a:t>
-            </a:r>
-          </a:p>
-          <a:p>
-            <a:pPr lvl="0" defTabSz="914400" eaLnBrk="0" fontAlgn="base" hangingPunct="0">
-              <a:spcBef>
-                <a:spcPct val="0"/>
-              </a:spcBef>
-              <a:spcAft>
-                <a:spcPct val="0"/>
-              </a:spcAft>
-            </a:pPr>
-            <a:r>
-              <a:rPr lang="en-US" altLang="fr-FR" sz="2000" b="1" dirty="0">
-                <a:solidFill>
-                  <a:schemeClr val="bg1"/>
-                </a:solidFill>
-                <a:latin typeface="Arial" panose="020B0604020202020204" pitchFamily="34" charset="0"/>
-              </a:rPr>
-              <a:t>It comes down to her tears on a sheet</a:t>
+              <a:t>GNR Sweet Child of mine 1</a:t>
             </a:r>
           </a:p>
           <a:p>
@@ -3132,262 +3076,6 @@
               <a:latin typeface="Arial" panose="020B0604020202020204" pitchFamily="34" charset="0"/>
             </a:endParaRPr>
           </a:p>
-          <a:p>
-            <a:pPr lvl="0" defTabSz="914400" eaLnBrk="0" fontAlgn="base" hangingPunct="0">
-              <a:spcBef>
-                <a:spcPct val="0"/>
-              </a:spcBef>
-              <a:spcAft>
-                <a:spcPct val="0"/>
-              </a:spcAft>
-            </a:pPr>
-            <a:r>
-              <a:rPr lang="en-US" altLang="fr-FR" sz="2000" b="1" dirty="0">
-                <a:solidFill>
-                  <a:schemeClr val="bg1"/>
-                </a:solidFill>
-                <a:latin typeface="Arial" panose="020B0604020202020204" pitchFamily="34" charset="0"/>
-              </a:rPr>
-              <a:t>But it's alright because</a:t>
-            </a:r>
-          </a:p>
-          <a:p>
-            <a:pPr lvl="0" defTabSz="914400" eaLnBrk="0" fontAlgn="base" hangingPunct="0">
-              <a:spcBef>
-                <a:spcPct val="0"/>
-              </a:spcBef>
-              <a:spcAft>
-                <a:spcPct val="0"/>
-              </a:spcAft>
-            </a:pPr>
-            <a:r>
-              <a:rPr lang="en-US" altLang="fr-FR" sz="2000" b="1" dirty="0">
-                <a:solidFill>
-                  <a:schemeClr val="bg1"/>
-                </a:solidFill>
-                <a:latin typeface="Arial" panose="020B0604020202020204" pitchFamily="34" charset="0"/>
-              </a:rPr>
-              <a:t>You cause lanterns to light</a:t>
-            </a:r>
-          </a:p>
-          <a:p>
-            <a:pPr lvl="0" defTabSz="914400" eaLnBrk="0" fontAlgn="base" hangingPunct="0">
-              <a:spcBef>
-                <a:spcPct val="0"/>
-              </a:spcBef>
-              <a:spcAft>
-                <a:spcPct val="0"/>
-              </a:spcAft>
-            </a:pPr>
-            <a:r>
-              <a:rPr lang="en-US" altLang="fr-FR" sz="2000" b="1" dirty="0">
-                <a:solidFill>
-                  <a:schemeClr val="bg1"/>
-                </a:solidFill>
-                <a:latin typeface="Arial" panose="020B0604020202020204" pitchFamily="34" charset="0"/>
-              </a:rPr>
-              <a:t>And force demons disperse</a:t>
-            </a:r>
-          </a:p>
-          <a:p>
-            <a:pPr lvl="0" defTabSz="914400" eaLnBrk="0" fontAlgn="base" hangingPunct="0">
-              <a:spcBef>
-                <a:spcPct val="0"/>
-              </a:spcBef>
-              <a:spcAft>
-                <a:spcPct val="0"/>
-              </a:spcAft>
-            </a:pPr>
-            <a:r>
-              <a:rPr lang="en-US" altLang="fr-FR" sz="2000" b="1" dirty="0">
-                <a:solidFill>
-                  <a:schemeClr val="bg1"/>
-                </a:solidFill>
-                <a:latin typeface="Arial" panose="020B0604020202020204" pitchFamily="34" charset="0"/>
-              </a:rPr>
-              <a:t>And if Lucifer may fear the swift drying of tears</a:t>
-            </a:r>
-          </a:p>
-          <a:p>
-            <a:pPr lvl="0" defTabSz="914400" eaLnBrk="0" fontAlgn="base" hangingPunct="0">
-              <a:spcBef>
-                <a:spcPct val="0"/>
-              </a:spcBef>
-              <a:spcAft>
-                <a:spcPct val="0"/>
-              </a:spcAft>
-            </a:pPr>
-            <a:r>
-              <a:rPr lang="en-US" altLang="fr-FR" sz="2000" b="1" dirty="0">
-                <a:solidFill>
-                  <a:schemeClr val="bg1"/>
-                </a:solidFill>
-                <a:latin typeface="Arial" panose="020B0604020202020204" pitchFamily="34" charset="0"/>
-              </a:rPr>
-              <a:t>Then, for evil, you could not be worse</a:t>
-            </a:r>
-          </a:p>
-          <a:p>
-            <a:pPr lvl="0" defTabSz="914400" eaLnBrk="0" fontAlgn="base" hangingPunct="0">
-              <a:spcBef>
-                <a:spcPct val="0"/>
-              </a:spcBef>
-              <a:spcAft>
-                <a:spcPct val="0"/>
-              </a:spcAft>
-            </a:pPr>
-            <a:endParaRPr lang="en-US" altLang="fr-FR" sz="2000" b="1" dirty="0">
-              <a:solidFill>
-                <a:schemeClr val="bg1"/>
-              </a:solidFill>
-              <a:latin typeface="Arial" panose="020B0604020202020204" pitchFamily="34" charset="0"/>
-            </a:endParaRPr>
-          </a:p>
-          <a:p>
-            <a:pPr lvl="0" defTabSz="914400" eaLnBrk="0" fontAlgn="base" hangingPunct="0">
-              <a:spcBef>
-                <a:spcPct val="0"/>
-              </a:spcBef>
-              <a:spcAft>
-                <a:spcPct val="0"/>
-              </a:spcAft>
-            </a:pPr>
-            <a:r>
-              <a:rPr lang="en-US" altLang="fr-FR" sz="2000" b="1" dirty="0">
-                <a:solidFill>
-                  <a:schemeClr val="bg1"/>
-                </a:solidFill>
-                <a:latin typeface="Arial" panose="020B0604020202020204" pitchFamily="34" charset="0"/>
-              </a:rPr>
-              <a:t>But I see you now, I see you</a:t>
-            </a:r>
-          </a:p>
-          <a:p>
-            <a:pPr lvl="0" defTabSz="914400" eaLnBrk="0" fontAlgn="base" hangingPunct="0">
-              <a:spcBef>
-                <a:spcPct val="0"/>
-              </a:spcBef>
-              <a:spcAft>
-                <a:spcPct val="0"/>
-              </a:spcAft>
-            </a:pPr>
-            <a:r>
-              <a:rPr lang="en-US" altLang="fr-FR" sz="2000" b="1" dirty="0">
-                <a:solidFill>
-                  <a:schemeClr val="bg1"/>
-                </a:solidFill>
-                <a:latin typeface="Arial" panose="020B0604020202020204" pitchFamily="34" charset="0"/>
-              </a:rPr>
-              <a:t>Release me now, </a:t>
-            </a:r>
-            <a:r>
-              <a:rPr lang="en-US" altLang="fr-FR" sz="2000" b="1" dirty="0" err="1">
-                <a:solidFill>
-                  <a:schemeClr val="bg1"/>
-                </a:solidFill>
-                <a:latin typeface="Arial" panose="020B0604020202020204" pitchFamily="34" charset="0"/>
-              </a:rPr>
-              <a:t>kinda</a:t>
-            </a:r>
-            <a:r>
-              <a:rPr lang="en-US" altLang="fr-FR" sz="2000" b="1" dirty="0">
-                <a:solidFill>
-                  <a:schemeClr val="bg1"/>
-                </a:solidFill>
-                <a:latin typeface="Arial" panose="020B0604020202020204" pitchFamily="34" charset="0"/>
-              </a:rPr>
-              <a:t> like dreams do</a:t>
-            </a:r>
-          </a:p>
-          <a:p>
-            <a:pPr lvl="0" defTabSz="914400" eaLnBrk="0" fontAlgn="base" hangingPunct="0">
-              <a:spcBef>
-                <a:spcPct val="0"/>
-              </a:spcBef>
-              <a:spcAft>
-                <a:spcPct val="0"/>
-              </a:spcAft>
-            </a:pPr>
-            <a:r>
-              <a:rPr lang="en-US" altLang="fr-FR" sz="2000" b="1" dirty="0">
-                <a:solidFill>
-                  <a:schemeClr val="bg1"/>
-                </a:solidFill>
-                <a:latin typeface="Arial" panose="020B0604020202020204" pitchFamily="34" charset="0"/>
-              </a:rPr>
-              <a:t>I see you now, was hard to see you</a:t>
-            </a:r>
-          </a:p>
-          <a:p>
-            <a:pPr lvl="0" defTabSz="914400" eaLnBrk="0" fontAlgn="base" hangingPunct="0">
-              <a:spcBef>
-                <a:spcPct val="0"/>
-              </a:spcBef>
-              <a:spcAft>
-                <a:spcPct val="0"/>
-              </a:spcAft>
-            </a:pPr>
-            <a:endParaRPr lang="en-US" altLang="fr-FR" sz="2000" b="1" dirty="0">
-              <a:solidFill>
-                <a:schemeClr val="bg1"/>
-              </a:solidFill>
-              <a:latin typeface="Arial" panose="020B0604020202020204" pitchFamily="34" charset="0"/>
-            </a:endParaRPr>
-          </a:p>
-          <a:p>
-            <a:pPr lvl="0" defTabSz="914400" eaLnBrk="0" fontAlgn="base" hangingPunct="0">
-              <a:spcBef>
-                <a:spcPct val="0"/>
-              </a:spcBef>
-              <a:spcAft>
-                <a:spcPct val="0"/>
-              </a:spcAft>
-            </a:pPr>
-            <a:r>
-              <a:rPr lang="en-US" altLang="fr-FR" sz="2000" b="1" dirty="0">
-                <a:solidFill>
-                  <a:schemeClr val="bg1"/>
-                </a:solidFill>
-                <a:latin typeface="Arial" panose="020B0604020202020204" pitchFamily="34" charset="0"/>
-              </a:rPr>
-              <a:t>Just don't forget to sing</a:t>
-            </a:r>
-          </a:p>
-          <a:p>
-            <a:pPr lvl="0" defTabSz="914400" eaLnBrk="0" fontAlgn="base" hangingPunct="0">
-              <a:spcBef>
-                <a:spcPct val="0"/>
-              </a:spcBef>
-              <a:spcAft>
-                <a:spcPct val="0"/>
-              </a:spcAft>
-            </a:pPr>
-            <a:r>
-              <a:rPr lang="en-US" altLang="fr-FR" sz="2000" b="1" dirty="0">
-                <a:solidFill>
-                  <a:schemeClr val="bg1"/>
-                </a:solidFill>
-                <a:latin typeface="Arial" panose="020B0604020202020204" pitchFamily="34" charset="0"/>
-              </a:rPr>
-              <a:t>Remember everything</a:t>
-            </a:r>
-          </a:p>
-          <a:p>
-            <a:pPr lvl="0" defTabSz="914400" eaLnBrk="0" fontAlgn="base" hangingPunct="0">
-              <a:spcBef>
-                <a:spcPct val="0"/>
-              </a:spcBef>
-              <a:spcAft>
-                <a:spcPct val="0"/>
-              </a:spcAft>
-            </a:pPr>
-            <a:endParaRPr lang="en-US" altLang="fr-FR" sz="2000" b="1" dirty="0">
-              <a:solidFill>
-                <a:schemeClr val="bg1"/>
-              </a:solidFill>
-              <a:latin typeface="Arial" panose="020B0604020202020204" pitchFamily="34" charset="0"/>
-            </a:endParaRPr>
-          </a:p>
         </p:txBody>
       </p:sp>
     </p:spTree>
@@ -3400,13 +3088,6 @@
   <p:clrMapOvr>
     <a:masterClrMapping/>
   </p:clrMapOvr>
-  <p:timing>
-    <p:tnLst>
-      <p:par>
-        <p:cTn id="1" dur="indefinite" restart="never" nodeType="tmRoot"/>
-      </p:par>
-    </p:tnLst>
-  </p:timing>
 </p:sld>
 </file>
 
@@ -3425,7 +3106,13 @@
     </p:bg>
     <p:spTree>
       <p:nvGrpSpPr>
-        <p:cNvPr id="1" name=""/>
+        <p:cNvPr id="1" name="">
+          <a:extLst>
+            <a:ext uri="{FF2B5EF4-FFF2-40B4-BE49-F238E27FC236}">
+              <a16:creationId xmlns:a16="http://schemas.microsoft.com/office/drawing/2014/main" id="{A6367010-D719-3852-67DD-0D13ACA978DF}"/>
+            </a:ext>
+          </a:extLst>
+        </p:cNvPr>
         <p:cNvGrpSpPr/>
         <p:nvPr/>
       </p:nvGrpSpPr>
@@ -3439,7 +3126,13 @@
       </p:grpSpPr>
       <p:sp>
         <p:nvSpPr>
-          <p:cNvPr id="4" name="Rectangle 1"/>
+          <p:cNvPr id="4" name="Rectangle 1">
+            <a:extLst>
+              <a:ext uri="{FF2B5EF4-FFF2-40B4-BE49-F238E27FC236}">
+                <a16:creationId xmlns:a16="http://schemas.microsoft.com/office/drawing/2014/main" id="{8A5F71A7-ADFA-FC4E-B900-43B329A9F754}"/>
+              </a:ext>
+            </a:extLst>
+          </p:cNvPr>
           <p:cNvSpPr>
             <a:spLocks noChangeArrowheads="1"/>
           </p:cNvSpPr>
@@ -3505,22 +3198,13 @@
               </a:spcAft>
             </a:pPr>
             <a:r>
-              <a:rPr lang="en-US" altLang="fr-FR" sz="1600" b="1" dirty="0" smtClean="0">
+              <a:rPr lang="en-US" altLang="fr-FR" sz="2000" b="1" dirty="0">
                 <a:solidFill>
                   <a:schemeClr val="bg1"/>
                 </a:solidFill>
                 <a:latin typeface="Arial" panose="020B0604020202020204" pitchFamily="34" charset="0"/>
               </a:rPr>
-              <a:t>You're </a:t>
-            </a:r>
-            <a:r>
-              <a:rPr lang="en-US" altLang="fr-FR" sz="1600" b="1" dirty="0">
-                <a:solidFill>
-                  <a:schemeClr val="bg1"/>
-                </a:solidFill>
-                <a:latin typeface="Arial" panose="020B0604020202020204" pitchFamily="34" charset="0"/>
-              </a:rPr>
-              <a:t>the only little girl I know who'd bring a kite in the snow</a:t>
+              <a:t>GNR Sweet Child of mine 2</a:t>
             </a:r>
           </a:p>
           <a:p>
@@ -3532,34 +3216,125 @@
                 <a:spcPct val="0"/>
               </a:spcAft>
             </a:pPr>
-            <a:r>
-              <a:rPr lang="en-US" altLang="fr-FR" sz="1600" b="1" dirty="0">
+            <a:endParaRPr lang="en-US" altLang="fr-FR" sz="2000" b="1" dirty="0">
+              <a:solidFill>
+                <a:schemeClr val="bg1"/>
+              </a:solidFill>
+              <a:latin typeface="Arial" panose="020B0604020202020204" pitchFamily="34" charset="0"/>
+            </a:endParaRPr>
+          </a:p>
+        </p:txBody>
+      </p:sp>
+    </p:spTree>
+    <p:extLst>
+      <p:ext uri="{BB962C8B-B14F-4D97-AF65-F5344CB8AC3E}">
+        <p14:creationId xmlns:p14="http://schemas.microsoft.com/office/powerpoint/2010/main" val="2115034979"/>
+      </p:ext>
+    </p:extLst>
+  </p:cSld>
+  <p:clrMapOvr>
+    <a:masterClrMapping/>
+  </p:clrMapOvr>
+</p:sld>
+</file>
+
+<file path=ppt/slides/slide3.xml><?xml version="1.0" encoding="utf-8"?>
+<p:sld xmlns:a="http://schemas.openxmlformats.org/drawingml/2006/main" xmlns:r="http://schemas.openxmlformats.org/officeDocument/2006/relationships" xmlns:p="http://schemas.openxmlformats.org/presentationml/2006/main">
+  <p:cSld>
+    <p:bg>
+      <p:bgPr>
+        <a:solidFill>
+          <a:schemeClr val="bg2">
+            <a:lumMod val="25000"/>
+          </a:schemeClr>
+        </a:solidFill>
+        <a:effectLst/>
+      </p:bgPr>
+    </p:bg>
+    <p:spTree>
+      <p:nvGrpSpPr>
+        <p:cNvPr id="1" name="">
+          <a:extLst>
+            <a:ext uri="{FF2B5EF4-FFF2-40B4-BE49-F238E27FC236}">
+              <a16:creationId xmlns:a16="http://schemas.microsoft.com/office/drawing/2014/main" id="{C3F546A2-6175-0E74-C9E6-6E9D0D5C2F81}"/>
+            </a:ext>
+          </a:extLst>
+        </p:cNvPr>
+        <p:cNvGrpSpPr/>
+        <p:nvPr/>
+      </p:nvGrpSpPr>
+      <p:grpSpPr>
+        <a:xfrm>
+          <a:off x="0" y="0"/>
+          <a:ext cx="0" cy="0"/>
+          <a:chOff x="0" y="0"/>
+          <a:chExt cx="0" cy="0"/>
+        </a:xfrm>
+      </p:grpSpPr>
+      <p:sp>
+        <p:nvSpPr>
+          <p:cNvPr id="4" name="Rectangle 1">
+            <a:extLst>
+              <a:ext uri="{FF2B5EF4-FFF2-40B4-BE49-F238E27FC236}">
+                <a16:creationId xmlns:a16="http://schemas.microsoft.com/office/drawing/2014/main" id="{B111470F-870F-153B-DE78-C0C46F4A8F24}"/>
+              </a:ext>
+            </a:extLst>
+          </p:cNvPr>
+          <p:cNvSpPr>
+            <a:spLocks noChangeArrowheads="1"/>
+          </p:cNvSpPr>
+          <p:nvPr/>
+        </p:nvSpPr>
+        <p:spPr bwMode="auto">
+          <a:xfrm flipH="1">
+            <a:off x="-1" y="0"/>
+            <a:ext cx="9143999" cy="6858001"/>
+          </a:xfrm>
+          <a:prstGeom prst="rect">
+            <a:avLst/>
+          </a:prstGeom>
+          <a:noFill/>
+          <a:ln>
+            <a:noFill/>
+          </a:ln>
+          <a:effectLst/>
+          <a:extLst>
+            <a:ext uri="{909E8E84-426E-40DD-AFC4-6F175D3DCCD1}">
+              <a14:hiddenFill xmlns:a14="http://schemas.microsoft.com/office/drawing/2010/main">
                 <a:solidFill>
-                  <a:schemeClr val="bg1"/>
+                  <a:schemeClr val="accent1"/>
                 </a:solidFill>
-                <a:latin typeface="Arial" panose="020B0604020202020204" pitchFamily="34" charset="0"/>
-              </a:rPr>
-              <a:t>Said, "you just </a:t>
-            </a:r>
-            <a:r>
-              <a:rPr lang="en-US" altLang="fr-FR" sz="1600" b="1" dirty="0" err="1">
+              </a14:hiddenFill>
+            </a:ext>
+            <a:ext uri="{91240B29-F687-4F45-9708-019B960494DF}">
+              <a14:hiddenLine xmlns:a14="http://schemas.microsoft.com/office/drawing/2010/main" w="9525">
                 <a:solidFill>
-                  <a:schemeClr val="bg1"/>
+                  <a:schemeClr val="tx1"/>
                 </a:solidFill>
-                <a:latin typeface="Arial" panose="020B0604020202020204" pitchFamily="34" charset="0"/>
-              </a:rPr>
-              <a:t>gonna</a:t>
-            </a:r>
-            <a:r>
-              <a:rPr lang="en-US" altLang="fr-FR" sz="1600" b="1" dirty="0">
-                <a:solidFill>
-                  <a:schemeClr val="bg1"/>
-                </a:solidFill>
-                <a:latin typeface="Arial" panose="020B0604020202020204" pitchFamily="34" charset="0"/>
-              </a:rPr>
-              <a:t> hold it up?"</a:t>
-            </a:r>
-          </a:p>
+                <a:miter lim="800000"/>
+                <a:headEnd/>
+                <a:tailEnd/>
+              </a14:hiddenLine>
+            </a:ext>
+            <a:ext uri="{AF507438-7753-43E0-B8FC-AC1667EBCBE1}">
+              <a14:hiddenEffects xmlns:a14="http://schemas.microsoft.com/office/drawing/2010/main">
+                <a:effectLst>
+                  <a:outerShdw dist="35921" dir="2700000" algn="ctr" rotWithShape="0">
+                    <a:schemeClr val="bg2"/>
+                  </a:outerShdw>
+                </a:effectLst>
+              </a14:hiddenEffects>
+            </a:ext>
+          </a:extLst>
+        </p:spPr>
+        <p:txBody>
+          <a:bodyPr vert="horz" wrap="square" lIns="91440" tIns="45720" rIns="91440" bIns="45720" numCol="2" anchor="ctr" anchorCtr="0" compatLnSpc="1">
+            <a:prstTxWarp prst="textNoShape">
+              <a:avLst/>
+            </a:prstTxWarp>
+            <a:normAutofit/>
+          </a:bodyPr>
+          <a:lstStyle/>
           <a:p>
             <a:pPr lvl="0" defTabSz="914400" eaLnBrk="0" fontAlgn="base" hangingPunct="0">
               <a:spcBef>
@@ -3570,32 +3345,29 @@
               </a:spcAft>
             </a:pPr>
             <a:r>
-              <a:rPr lang="en-US" altLang="fr-FR" sz="1600" b="1" dirty="0">
+              <a:rPr lang="en-US" altLang="fr-FR" sz="2000" b="1" dirty="0">
                 <a:solidFill>
                   <a:schemeClr val="bg1"/>
                 </a:solidFill>
                 <a:latin typeface="Arial" panose="020B0604020202020204" pitchFamily="34" charset="0"/>
               </a:rPr>
-              <a:t>You said, "Nah, I'm </a:t>
-            </a:r>
-            <a:r>
-              <a:rPr lang="en-US" altLang="fr-FR" sz="1600" b="1" dirty="0" err="1">
+              <a:t>GNR Sweet Child of </a:t>
+            </a:r>
+            <a:r>
+              <a:rPr lang="en-US" altLang="fr-FR" sz="2000" b="1">
                 <a:solidFill>
                   <a:schemeClr val="bg1"/>
                 </a:solidFill>
                 <a:latin typeface="Arial" panose="020B0604020202020204" pitchFamily="34" charset="0"/>
               </a:rPr>
-              <a:t>gonna</a:t>
-            </a:r>
-            <a:r>
-              <a:rPr lang="en-US" altLang="fr-FR" sz="1600" b="1" dirty="0">
-                <a:solidFill>
-                  <a:schemeClr val="bg1"/>
-                </a:solidFill>
-                <a:latin typeface="Arial" panose="020B0604020202020204" pitchFamily="34" charset="0"/>
-              </a:rPr>
-              <a:t> let it go"</a:t>
-            </a:r>
+              <a:t>mine 3</a:t>
+            </a:r>
+            <a:endParaRPr lang="en-US" altLang="fr-FR" sz="2000" b="1" dirty="0">
+              <a:solidFill>
+                <a:schemeClr val="bg1"/>
+              </a:solidFill>
+              <a:latin typeface="Arial" panose="020B0604020202020204" pitchFamily="34" charset="0"/>
+            </a:endParaRPr>
           </a:p>
           <a:p>
             <a:pPr lvl="0" defTabSz="914400" eaLnBrk="0" fontAlgn="base" hangingPunct="0">
@@ -3606,424 +3378,25 @@
                 <a:spcPct val="0"/>
               </a:spcAft>
             </a:pPr>
-            <a:r>
-              <a:rPr lang="en-US" altLang="fr-FR" sz="1600" b="1" dirty="0">
-                <a:solidFill>
-                  <a:schemeClr val="bg1"/>
-                </a:solidFill>
-                <a:latin typeface="Arial" panose="020B0604020202020204" pitchFamily="34" charset="0"/>
-              </a:rPr>
-              <a:t>When your heart hurts</a:t>
-            </a:r>
-          </a:p>
-          <a:p>
-            <a:pPr lvl="0" defTabSz="914400" eaLnBrk="0" fontAlgn="base" hangingPunct="0">
-              <a:spcBef>
-                <a:spcPct val="0"/>
-              </a:spcBef>
-              <a:spcAft>
-                <a:spcPct val="0"/>
-              </a:spcAft>
-            </a:pPr>
-            <a:r>
-              <a:rPr lang="en-US" altLang="fr-FR" sz="1600" b="1" dirty="0">
-                <a:solidFill>
-                  <a:schemeClr val="bg1"/>
-                </a:solidFill>
-                <a:latin typeface="Arial" panose="020B0604020202020204" pitchFamily="34" charset="0"/>
-              </a:rPr>
-              <a:t>Days like today are the antidote</a:t>
-            </a:r>
-          </a:p>
-          <a:p>
-            <a:pPr lvl="0" defTabSz="914400" eaLnBrk="0" fontAlgn="base" hangingPunct="0">
-              <a:spcBef>
-                <a:spcPct val="0"/>
-              </a:spcBef>
-              <a:spcAft>
-                <a:spcPct val="0"/>
-              </a:spcAft>
-            </a:pPr>
-            <a:r>
-              <a:rPr lang="en-US" altLang="fr-FR" sz="1600" b="1" dirty="0">
-                <a:solidFill>
-                  <a:schemeClr val="bg1"/>
-                </a:solidFill>
-                <a:latin typeface="Arial" panose="020B0604020202020204" pitchFamily="34" charset="0"/>
-              </a:rPr>
-              <a:t>If you think just maybe it's her</a:t>
-            </a:r>
-          </a:p>
-          <a:p>
-            <a:pPr lvl="0" defTabSz="914400" eaLnBrk="0" fontAlgn="base" hangingPunct="0">
-              <a:spcBef>
-                <a:spcPct val="0"/>
-              </a:spcBef>
-              <a:spcAft>
-                <a:spcPct val="0"/>
-              </a:spcAft>
-            </a:pPr>
-            <a:r>
-              <a:rPr lang="en-US" altLang="fr-FR" sz="1600" b="1" dirty="0">
-                <a:solidFill>
-                  <a:schemeClr val="bg1"/>
-                </a:solidFill>
-                <a:latin typeface="Arial" panose="020B0604020202020204" pitchFamily="34" charset="0"/>
-              </a:rPr>
-              <a:t>Then promise me, young man, you're </a:t>
-            </a:r>
-            <a:r>
-              <a:rPr lang="en-US" altLang="fr-FR" sz="1600" b="1" dirty="0" err="1">
-                <a:solidFill>
-                  <a:schemeClr val="bg1"/>
-                </a:solidFill>
-                <a:latin typeface="Arial" panose="020B0604020202020204" pitchFamily="34" charset="0"/>
-              </a:rPr>
-              <a:t>gonna</a:t>
-            </a:r>
-            <a:r>
-              <a:rPr lang="en-US" altLang="fr-FR" sz="1600" b="1" dirty="0">
-                <a:solidFill>
-                  <a:schemeClr val="bg1"/>
-                </a:solidFill>
-                <a:latin typeface="Arial" panose="020B0604020202020204" pitchFamily="34" charset="0"/>
-              </a:rPr>
-              <a:t> let her know</a:t>
-            </a:r>
-          </a:p>
-          <a:p>
-            <a:pPr lvl="0" defTabSz="914400" eaLnBrk="0" fontAlgn="base" hangingPunct="0">
-              <a:spcBef>
-                <a:spcPct val="0"/>
-              </a:spcBef>
-              <a:spcAft>
-                <a:spcPct val="0"/>
-              </a:spcAft>
-            </a:pPr>
-            <a:endParaRPr lang="en-US" altLang="fr-FR" sz="1600" b="1" dirty="0">
+            <a:endParaRPr lang="en-US" altLang="fr-FR" sz="2000" b="1" dirty="0">
               <a:solidFill>
                 <a:schemeClr val="bg1"/>
               </a:solidFill>
               <a:latin typeface="Arial" panose="020B0604020202020204" pitchFamily="34" charset="0"/>
             </a:endParaRPr>
           </a:p>
-          <a:p>
-            <a:pPr lvl="0" defTabSz="914400" eaLnBrk="0" fontAlgn="base" hangingPunct="0">
-              <a:spcBef>
-                <a:spcPct val="0"/>
-              </a:spcBef>
-              <a:spcAft>
-                <a:spcPct val="0"/>
-              </a:spcAft>
-            </a:pPr>
-            <a:r>
-              <a:rPr lang="en-US" altLang="fr-FR" sz="1600" b="1" dirty="0">
-                <a:solidFill>
-                  <a:schemeClr val="bg1"/>
-                </a:solidFill>
-                <a:latin typeface="Arial" panose="020B0604020202020204" pitchFamily="34" charset="0"/>
-              </a:rPr>
-              <a:t>You won't go lonely, yeah</a:t>
-            </a:r>
-          </a:p>
-          <a:p>
-            <a:pPr lvl="0" defTabSz="914400" eaLnBrk="0" fontAlgn="base" hangingPunct="0">
-              <a:spcBef>
-                <a:spcPct val="0"/>
-              </a:spcBef>
-              <a:spcAft>
-                <a:spcPct val="0"/>
-              </a:spcAft>
-            </a:pPr>
-            <a:r>
-              <a:rPr lang="en-US" altLang="fr-FR" sz="1600" b="1" dirty="0">
-                <a:solidFill>
-                  <a:schemeClr val="bg1"/>
-                </a:solidFill>
-                <a:latin typeface="Arial" panose="020B0604020202020204" pitchFamily="34" charset="0"/>
-              </a:rPr>
-              <a:t>You won't go lonely, yeah</a:t>
-            </a:r>
-          </a:p>
-          <a:p>
-            <a:pPr lvl="0" defTabSz="914400" eaLnBrk="0" fontAlgn="base" hangingPunct="0">
-              <a:spcBef>
-                <a:spcPct val="0"/>
-              </a:spcBef>
-              <a:spcAft>
-                <a:spcPct val="0"/>
-              </a:spcAft>
-            </a:pPr>
-            <a:r>
-              <a:rPr lang="en-US" altLang="fr-FR" sz="1600" b="1" dirty="0">
-                <a:solidFill>
-                  <a:schemeClr val="bg1"/>
-                </a:solidFill>
-                <a:latin typeface="Arial" panose="020B0604020202020204" pitchFamily="34" charset="0"/>
-              </a:rPr>
-              <a:t>You won't go lonely, yeah</a:t>
-            </a:r>
-          </a:p>
-          <a:p>
-            <a:pPr lvl="0" defTabSz="914400" eaLnBrk="0" fontAlgn="base" hangingPunct="0">
-              <a:spcBef>
-                <a:spcPct val="0"/>
-              </a:spcBef>
-              <a:spcAft>
-                <a:spcPct val="0"/>
-              </a:spcAft>
-            </a:pPr>
-            <a:r>
-              <a:rPr lang="en-US" altLang="fr-FR" sz="1600" b="1" dirty="0">
-                <a:solidFill>
-                  <a:schemeClr val="bg1"/>
-                </a:solidFill>
-                <a:latin typeface="Arial" panose="020B0604020202020204" pitchFamily="34" charset="0"/>
-              </a:rPr>
-              <a:t>You won't go lonely, yeah</a:t>
-            </a:r>
-          </a:p>
-          <a:p>
-            <a:pPr lvl="0" defTabSz="914400" eaLnBrk="0" fontAlgn="base" hangingPunct="0">
-              <a:spcBef>
-                <a:spcPct val="0"/>
-              </a:spcBef>
-              <a:spcAft>
-                <a:spcPct val="0"/>
-              </a:spcAft>
-            </a:pPr>
-            <a:r>
-              <a:rPr lang="en-US" altLang="fr-FR" sz="1600" b="1" dirty="0">
-                <a:solidFill>
-                  <a:schemeClr val="bg1"/>
-                </a:solidFill>
-                <a:latin typeface="Arial" panose="020B0604020202020204" pitchFamily="34" charset="0"/>
-              </a:rPr>
-              <a:t>You won't go lonely, yeah</a:t>
-            </a:r>
-          </a:p>
-          <a:p>
-            <a:pPr lvl="0" defTabSz="914400" eaLnBrk="0" fontAlgn="base" hangingPunct="0">
-              <a:spcBef>
-                <a:spcPct val="0"/>
-              </a:spcBef>
-              <a:spcAft>
-                <a:spcPct val="0"/>
-              </a:spcAft>
-            </a:pPr>
-            <a:endParaRPr lang="en-US" altLang="fr-FR" sz="1600" b="1" dirty="0">
-              <a:solidFill>
-                <a:schemeClr val="bg1"/>
-              </a:solidFill>
-              <a:latin typeface="Arial" panose="020B0604020202020204" pitchFamily="34" charset="0"/>
-            </a:endParaRPr>
-          </a:p>
-          <a:p>
-            <a:pPr lvl="0" defTabSz="914400" eaLnBrk="0" fontAlgn="base" hangingPunct="0">
-              <a:spcBef>
-                <a:spcPct val="0"/>
-              </a:spcBef>
-              <a:spcAft>
-                <a:spcPct val="0"/>
-              </a:spcAft>
-            </a:pPr>
-            <a:r>
-              <a:rPr lang="en-US" altLang="fr-FR" sz="1600" b="1" dirty="0">
-                <a:solidFill>
-                  <a:schemeClr val="bg1"/>
-                </a:solidFill>
-                <a:latin typeface="Arial" panose="020B0604020202020204" pitchFamily="34" charset="0"/>
-              </a:rPr>
-              <a:t>It'll all be better in the morning</a:t>
-            </a:r>
-          </a:p>
-          <a:p>
-            <a:pPr lvl="0" defTabSz="914400" eaLnBrk="0" fontAlgn="base" hangingPunct="0">
-              <a:spcBef>
-                <a:spcPct val="0"/>
-              </a:spcBef>
-              <a:spcAft>
-                <a:spcPct val="0"/>
-              </a:spcAft>
-            </a:pPr>
-            <a:r>
-              <a:rPr lang="en-US" altLang="fr-FR" sz="1600" b="1" dirty="0" err="1">
-                <a:solidFill>
-                  <a:schemeClr val="bg1"/>
-                </a:solidFill>
-                <a:latin typeface="Arial" panose="020B0604020202020204" pitchFamily="34" charset="0"/>
-              </a:rPr>
-              <a:t>'Cause</a:t>
-            </a:r>
-            <a:r>
-              <a:rPr lang="en-US" altLang="fr-FR" sz="1600" b="1" dirty="0">
-                <a:solidFill>
-                  <a:schemeClr val="bg1"/>
-                </a:solidFill>
-                <a:latin typeface="Arial" panose="020B0604020202020204" pitchFamily="34" charset="0"/>
-              </a:rPr>
-              <a:t> while you sleep I'll build a wall</a:t>
-            </a:r>
-          </a:p>
-          <a:p>
-            <a:pPr lvl="0" defTabSz="914400" eaLnBrk="0" fontAlgn="base" hangingPunct="0">
-              <a:spcBef>
-                <a:spcPct val="0"/>
-              </a:spcBef>
-              <a:spcAft>
-                <a:spcPct val="0"/>
-              </a:spcAft>
-            </a:pPr>
-            <a:r>
-              <a:rPr lang="en-US" altLang="fr-FR" sz="1600" b="1" dirty="0">
-                <a:solidFill>
-                  <a:schemeClr val="bg1"/>
-                </a:solidFill>
-                <a:latin typeface="Arial" panose="020B0604020202020204" pitchFamily="34" charset="0"/>
-              </a:rPr>
-              <a:t>But pick a weapon up or something</a:t>
-            </a:r>
-          </a:p>
-          <a:p>
-            <a:pPr lvl="0" defTabSz="914400" eaLnBrk="0" fontAlgn="base" hangingPunct="0">
-              <a:spcBef>
-                <a:spcPct val="0"/>
-              </a:spcBef>
-              <a:spcAft>
-                <a:spcPct val="0"/>
-              </a:spcAft>
-            </a:pPr>
-            <a:r>
-              <a:rPr lang="en-US" altLang="fr-FR" sz="1600" b="1" dirty="0">
-                <a:solidFill>
-                  <a:schemeClr val="bg1"/>
-                </a:solidFill>
-                <a:latin typeface="Arial" panose="020B0604020202020204" pitchFamily="34" charset="0"/>
-              </a:rPr>
-              <a:t>We're 'bout to have ourselves a brawl</a:t>
-            </a:r>
-          </a:p>
-          <a:p>
-            <a:pPr lvl="0" defTabSz="914400" eaLnBrk="0" fontAlgn="base" hangingPunct="0">
-              <a:spcBef>
-                <a:spcPct val="0"/>
-              </a:spcBef>
-              <a:spcAft>
-                <a:spcPct val="0"/>
-              </a:spcAft>
-            </a:pPr>
-            <a:endParaRPr lang="en-US" altLang="fr-FR" sz="1600" b="1" dirty="0">
-              <a:solidFill>
-                <a:schemeClr val="bg1"/>
-              </a:solidFill>
-              <a:latin typeface="Arial" panose="020B0604020202020204" pitchFamily="34" charset="0"/>
-            </a:endParaRPr>
-          </a:p>
-          <a:p>
-            <a:pPr lvl="0" defTabSz="914400" eaLnBrk="0" fontAlgn="base" hangingPunct="0">
-              <a:spcBef>
-                <a:spcPct val="0"/>
-              </a:spcBef>
-              <a:spcAft>
-                <a:spcPct val="0"/>
-              </a:spcAft>
-            </a:pPr>
-            <a:r>
-              <a:rPr lang="en-US" altLang="fr-FR" sz="1600" b="1" dirty="0">
-                <a:solidFill>
-                  <a:schemeClr val="bg1"/>
-                </a:solidFill>
-                <a:latin typeface="Arial" panose="020B0604020202020204" pitchFamily="34" charset="0"/>
-              </a:rPr>
-              <a:t>In dead of night, one window open</a:t>
-            </a:r>
-          </a:p>
-          <a:p>
-            <a:pPr lvl="0" defTabSz="914400" eaLnBrk="0" fontAlgn="base" hangingPunct="0">
-              <a:spcBef>
-                <a:spcPct val="0"/>
-              </a:spcBef>
-              <a:spcAft>
-                <a:spcPct val="0"/>
-              </a:spcAft>
-            </a:pPr>
-            <a:r>
-              <a:rPr lang="en-US" altLang="fr-FR" sz="1600" b="1" dirty="0">
-                <a:solidFill>
-                  <a:schemeClr val="bg1"/>
-                </a:solidFill>
-                <a:latin typeface="Arial" panose="020B0604020202020204" pitchFamily="34" charset="0"/>
-              </a:rPr>
-              <a:t>He heard her singing down the hall</a:t>
-            </a:r>
-          </a:p>
-          <a:p>
-            <a:pPr lvl="0" defTabSz="914400" eaLnBrk="0" fontAlgn="base" hangingPunct="0">
-              <a:spcBef>
-                <a:spcPct val="0"/>
-              </a:spcBef>
-              <a:spcAft>
-                <a:spcPct val="0"/>
-              </a:spcAft>
-            </a:pPr>
-            <a:r>
-              <a:rPr lang="en-US" altLang="fr-FR" sz="1600" b="1" dirty="0">
-                <a:solidFill>
-                  <a:schemeClr val="bg1"/>
-                </a:solidFill>
-                <a:latin typeface="Arial" panose="020B0604020202020204" pitchFamily="34" charset="0"/>
-              </a:rPr>
-              <a:t>Singing 'bout him, least he was hoping</a:t>
-            </a:r>
-          </a:p>
-          <a:p>
-            <a:pPr lvl="0" defTabSz="914400" eaLnBrk="0" fontAlgn="base" hangingPunct="0">
-              <a:spcBef>
-                <a:spcPct val="0"/>
-              </a:spcBef>
-              <a:spcAft>
-                <a:spcPct val="0"/>
-              </a:spcAft>
-            </a:pPr>
-            <a:r>
-              <a:rPr lang="en-US" altLang="fr-FR" sz="1600" b="1" dirty="0">
-                <a:solidFill>
-                  <a:schemeClr val="bg1"/>
-                </a:solidFill>
-                <a:latin typeface="Arial" panose="020B0604020202020204" pitchFamily="34" charset="0"/>
-              </a:rPr>
-              <a:t>She left her listener enthralled </a:t>
-            </a:r>
-            <a:endParaRPr kumimoji="0" lang="en-US" altLang="fr-FR" sz="1600" b="1" i="0" u="none" strike="noStrike" cap="none" normalizeH="0" baseline="0" dirty="0" smtClean="0">
-              <a:ln>
-                <a:noFill/>
-              </a:ln>
-              <a:solidFill>
-                <a:schemeClr val="bg1"/>
-              </a:solidFill>
-              <a:effectLst/>
-              <a:latin typeface="Arial" panose="020B0604020202020204" pitchFamily="34" charset="0"/>
-            </a:endParaRPr>
-          </a:p>
         </p:txBody>
       </p:sp>
     </p:spTree>
     <p:extLst>
       <p:ext uri="{BB962C8B-B14F-4D97-AF65-F5344CB8AC3E}">
-        <p14:creationId xmlns:p14="http://schemas.microsoft.com/office/powerpoint/2010/main" val="3762941951"/>
+        <p14:creationId xmlns:p14="http://schemas.microsoft.com/office/powerpoint/2010/main" val="2271514095"/>
       </p:ext>
     </p:extLst>
   </p:cSld>
   <p:clrMapOvr>
     <a:masterClrMapping/>
   </p:clrMapOvr>
-  <p:timing>
-    <p:tnLst>
-      <p:par>
-        <p:cTn id="1" dur="indefinite" restart="never" nodeType="tmRoot"/>
-      </p:par>
-    </p:tnLst>
-  </p:timing>
 </p:sld>
 </file>
 

</xml_diff>